<commit_message>
before pushing, override lv's commit
</commit_message>
<xml_diff>
--- a/Unsupervised Pattern Discovery in Speech.pptx
+++ b/Unsupervised Pattern Discovery in Speech.pptx
@@ -16,7 +16,8 @@
     <p:sldId id="264" r:id="rId10"/>
     <p:sldId id="265" r:id="rId11"/>
     <p:sldId id="266" r:id="rId12"/>
-    <p:sldId id="267" r:id="rId13"/>
+    <p:sldId id="268" r:id="rId13"/>
+    <p:sldId id="267" r:id="rId14"/>
   </p:sldIdLst>
   <p:sldSz cx="12192000" cy="6858000"/>
   <p:notesSz cx="6858000" cy="9144000"/>
@@ -4633,7 +4634,24 @@
           <a:bodyPr/>
           <a:lstStyle/>
           <a:p>
-            <a:endParaRPr lang="en-US"/>
+            <a:r>
+              <a:rPr lang="en-US" dirty="0"/>
+              <a:t>Implemented the whole algorithm in Python 3, using SciPy, </a:t>
+            </a:r>
+            <a:r>
+              <a:rPr lang="en-US" dirty="0" err="1"/>
+              <a:t>librosa</a:t>
+            </a:r>
+            <a:r>
+              <a:rPr lang="en-US" dirty="0"/>
+              <a:t>.</a:t>
+            </a:r>
+          </a:p>
+          <a:p>
+            <a:r>
+              <a:rPr lang="en-US" dirty="0"/>
+              <a:t>With some simplifications to the original proposed algorithm.</a:t>
+            </a:r>
           </a:p>
         </p:txBody>
       </p:sp>
@@ -4740,6 +4758,91 @@
       </p:grpSpPr>
       <p:sp>
         <p:nvSpPr>
+          <p:cNvPr id="2" name="Title 1"/>
+          <p:cNvSpPr>
+            <a:spLocks noGrp="1"/>
+          </p:cNvSpPr>
+          <p:nvPr>
+            <p:ph type="title"/>
+          </p:nvPr>
+        </p:nvSpPr>
+        <p:spPr/>
+        <p:txBody>
+          <a:bodyPr/>
+          <a:lstStyle/>
+          <a:p>
+            <a:r>
+              <a:rPr lang="en-US" dirty="0"/>
+              <a:t>Reference</a:t>
+            </a:r>
+          </a:p>
+        </p:txBody>
+      </p:sp>
+      <p:sp>
+        <p:nvSpPr>
+          <p:cNvPr id="3" name="Content Placeholder 2"/>
+          <p:cNvSpPr>
+            <a:spLocks noGrp="1"/>
+          </p:cNvSpPr>
+          <p:nvPr>
+            <p:ph idx="1"/>
+          </p:nvPr>
+        </p:nvSpPr>
+        <p:spPr/>
+        <p:txBody>
+          <a:bodyPr/>
+          <a:lstStyle/>
+          <a:p>
+            <a:r>
+              <a:rPr lang="en-US" dirty="0"/>
+              <a:t>Park, Alex S., and James R. Glass. "Unsupervised pattern discovery in speech." </a:t>
+            </a:r>
+            <a:r>
+              <a:rPr lang="en-US" i="1" dirty="0"/>
+              <a:t>IEEE Transactions on Audio, Speech, and Language Processing</a:t>
+            </a:r>
+            <a:r>
+              <a:rPr lang="en-US" dirty="0"/>
+              <a:t> 16.1 (2008): 186-197.</a:t>
+            </a:r>
+          </a:p>
+          <a:p>
+            <a:endParaRPr lang="en-US" dirty="0"/>
+          </a:p>
+        </p:txBody>
+      </p:sp>
+    </p:spTree>
+    <p:extLst>
+      <p:ext uri="{BB962C8B-B14F-4D97-AF65-F5344CB8AC3E}">
+        <p14:creationId xmlns:p14="http://schemas.microsoft.com/office/powerpoint/2010/main" val="961375995"/>
+      </p:ext>
+    </p:extLst>
+  </p:cSld>
+  <p:clrMapOvr>
+    <a:masterClrMapping/>
+  </p:clrMapOvr>
+</p:sld>
+</file>
+
+<file path=ppt/slides/slide13.xml><?xml version="1.0" encoding="utf-8"?>
+<p:sld xmlns:a="http://schemas.openxmlformats.org/drawingml/2006/main" xmlns:r="http://schemas.openxmlformats.org/officeDocument/2006/relationships" xmlns:p="http://schemas.openxmlformats.org/presentationml/2006/main">
+  <p:cSld>
+    <p:spTree>
+      <p:nvGrpSpPr>
+        <p:cNvPr id="1" name=""/>
+        <p:cNvGrpSpPr/>
+        <p:nvPr/>
+      </p:nvGrpSpPr>
+      <p:grpSpPr>
+        <a:xfrm>
+          <a:off x="0" y="0"/>
+          <a:ext cx="0" cy="0"/>
+          <a:chOff x="0" y="0"/>
+          <a:chExt cx="0" cy="0"/>
+        </a:xfrm>
+      </p:grpSpPr>
+      <p:sp>
+        <p:nvSpPr>
           <p:cNvPr id="4" name="Title 3"/>
           <p:cNvSpPr>
             <a:spLocks noGrp="1"/>
@@ -5382,7 +5485,7 @@
           <a:p>
             <a:r>
               <a:rPr lang="en-US" dirty="0"/>
-              <a:t>We cannot handle the correlation problem for all sample points, therefore we try to find certain times that are representative.</a:t>
+              <a:t>We cannot handle the correlation problem for all sample points, so we try to find certain time indices that are representative.</a:t>
             </a:r>
           </a:p>
           <a:p>

</xml_diff>

<commit_message>
update report and added data and result
</commit_message>
<xml_diff>
--- a/Unsupervised Pattern Discovery in Speech.pptx
+++ b/Unsupervised Pattern Discovery in Speech.pptx
@@ -130,6 +130,10 @@
 </p:presentation>
 </file>
 
+<file path=ppt/revisionInfo.xml><?xml version="1.0" encoding="utf-8"?>
+<p1510:revInfo xmlns:a="http://schemas.openxmlformats.org/drawingml/2006/main" xmlns:r="http://schemas.openxmlformats.org/officeDocument/2006/relationships" xmlns:p1510="http://schemas.microsoft.com/office/powerpoint/2015/10/main"/>
+</file>
+
 <file path=ppt/slideLayouts/slideLayout1.xml><?xml version="1.0" encoding="utf-8"?>
 <p:sldLayout xmlns:a="http://schemas.openxmlformats.org/drawingml/2006/main" xmlns:r="http://schemas.openxmlformats.org/officeDocument/2006/relationships" xmlns:p="http://schemas.openxmlformats.org/presentationml/2006/main" type="title" preserve="1">
   <p:cSld name="Title Slide">
@@ -347,7 +351,7 @@
           <a:p>
             <a:fld id="{9AB3A824-1A51-4B26-AD58-A6D8E14F6C04}" type="datetimeFigureOut">
               <a:rPr lang="en-US" dirty="0"/>
-              <a:t>6/16/2017</a:t>
+              <a:t>6/17/2017</a:t>
             </a:fld>
             <a:endParaRPr lang="en-US" dirty="0"/>
           </a:p>
@@ -681,7 +685,7 @@
           <a:p>
             <a:fld id="{D857E33E-8B18-4087-B112-809917729534}" type="datetimeFigureOut">
               <a:rPr lang="en-US" dirty="0"/>
-              <a:t>6/16/2017</a:t>
+              <a:t>6/17/2017</a:t>
             </a:fld>
             <a:endParaRPr lang="en-US" dirty="0"/>
           </a:p>
@@ -983,7 +987,7 @@
           <a:p>
             <a:fld id="{D3FFE419-2371-464F-8239-3959401C3561}" type="datetimeFigureOut">
               <a:rPr lang="en-US" dirty="0"/>
-              <a:t>6/16/2017</a:t>
+              <a:t>6/17/2017</a:t>
             </a:fld>
             <a:endParaRPr lang="en-US" dirty="0"/>
           </a:p>
@@ -1230,7 +1234,7 @@
           <a:p>
             <a:fld id="{97D162C4-EDD9-4389-A98B-B87ECEA2A816}" type="datetimeFigureOut">
               <a:rPr lang="en-US" dirty="0"/>
-              <a:t>6/16/2017</a:t>
+              <a:t>6/17/2017</a:t>
             </a:fld>
             <a:endParaRPr lang="en-US" dirty="0"/>
           </a:p>
@@ -1637,7 +1641,7 @@
           <a:p>
             <a:fld id="{3E5059C3-6A89-4494-99FF-5A4D6FFD50EB}" type="datetimeFigureOut">
               <a:rPr lang="en-US" dirty="0"/>
-              <a:t>6/16/2017</a:t>
+              <a:t>6/17/2017</a:t>
             </a:fld>
             <a:endParaRPr lang="en-US" dirty="0"/>
           </a:p>
@@ -1951,7 +1955,7 @@
           <a:p>
             <a:fld id="{CA954B2F-12DE-47F5-8894-472B206D2E1E}" type="datetimeFigureOut">
               <a:rPr lang="en-US" dirty="0"/>
-              <a:t>6/16/2017</a:t>
+              <a:t>6/17/2017</a:t>
             </a:fld>
             <a:endParaRPr lang="en-US" dirty="0"/>
           </a:p>
@@ -2495,7 +2499,7 @@
           <a:p>
             <a:fld id="{3F30E46F-7819-4ACF-B48B-48222C2ACC88}" type="datetimeFigureOut">
               <a:rPr lang="en-US" dirty="0"/>
-              <a:t>6/16/2017</a:t>
+              <a:t>6/17/2017</a:t>
             </a:fld>
             <a:endParaRPr lang="en-US" dirty="0"/>
           </a:p>
@@ -2690,7 +2694,7 @@
           <a:p>
             <a:fld id="{1FAF3416-4057-4DAA-829D-4CA07428D088}" type="datetimeFigureOut">
               <a:rPr lang="en-US" dirty="0"/>
-              <a:t>6/16/2017</a:t>
+              <a:t>6/17/2017</a:t>
             </a:fld>
             <a:endParaRPr lang="en-US" dirty="0"/>
           </a:p>
@@ -2903,7 +2907,7 @@
           <a:p>
             <a:fld id="{921D9284-D300-4297-87F7-E791DCC15DB1}" type="datetimeFigureOut">
               <a:rPr lang="en-US" dirty="0"/>
-              <a:t>6/16/2017</a:t>
+              <a:t>6/17/2017</a:t>
             </a:fld>
             <a:endParaRPr lang="en-US" dirty="0"/>
           </a:p>
@@ -3272,7 +3276,7 @@
           <a:p>
             <a:fld id="{37D525BB-DA17-4BA0-B3C8-3AC3ABC827E6}" type="datetimeFigureOut">
               <a:rPr lang="en-US" dirty="0"/>
-              <a:t>6/16/2017</a:t>
+              <a:t>6/17/2017</a:t>
             </a:fld>
             <a:endParaRPr lang="en-US" dirty="0"/>
           </a:p>
@@ -3675,7 +3679,7 @@
           <a:p>
             <a:fld id="{B16C4C9A-3960-41CF-A4E9-2A8FB932454B}" type="datetimeFigureOut">
               <a:rPr lang="en-US" dirty="0"/>
-              <a:t>6/16/2017</a:t>
+              <a:t>6/17/2017</a:t>
             </a:fld>
             <a:endParaRPr lang="en-US" dirty="0"/>
           </a:p>
@@ -4013,7 +4017,7 @@
           <a:p>
             <a:fld id="{3CBC1C18-307B-4F68-A007-B5B542270E8D}" type="datetimeFigureOut">
               <a:rPr lang="en-US" dirty="0"/>
-              <a:t>6/16/2017</a:t>
+              <a:t>6/17/2017</a:t>
             </a:fld>
             <a:endParaRPr lang="en-US" dirty="0"/>
           </a:p>
@@ -5247,7 +5251,11 @@
           <a:p>
             <a:r>
               <a:rPr lang="en-US" dirty="0"/>
-              <a:t>Implemented the whole algorithm in Python 3, using SciPy, </a:t>
+              <a:t>Implemented the algorithm in Python 3, using </a:t>
+            </a:r>
+            <a:r>
+              <a:rPr lang="en-US"/>
+              <a:t>NumPy, </a:t>
             </a:r>
             <a:r>
               <a:rPr lang="en-US" dirty="0" err="1"/>
@@ -5261,7 +5269,7 @@
           <a:p>
             <a:r>
               <a:rPr lang="en-US" dirty="0"/>
-              <a:t>With some simplifications to the original proposed algorithm.</a:t>
+              <a:t>With some simplifications to the original algorithm.</a:t>
             </a:r>
           </a:p>
         </p:txBody>
@@ -5296,8 +5304,8 @@
           <a:chExt cx="0" cy="0"/>
         </a:xfrm>
       </p:grpSpPr>
-      <mc:AlternateContent xmlns:mc="http://schemas.openxmlformats.org/markup-compatibility/2006">
-        <mc:Choice xmlns:a14="http://schemas.microsoft.com/office/drawing/2010/main" Requires="a14">
+      <mc:AlternateContent xmlns:mc="http://schemas.openxmlformats.org/markup-compatibility/2006" xmlns:a14="http://schemas.microsoft.com/office/drawing/2010/main">
+        <mc:Choice Requires="a14">
           <p:sp>
             <p:nvSpPr>
               <p:cNvPr id="2" name="Title 1"/>
@@ -5313,7 +5321,6 @@
               <a:bodyPr/>
               <a:lstStyle/>
               <a:p>
-                <a:pPr/>
                 <a14:m>
                   <m:oMath xmlns:m="http://schemas.openxmlformats.org/officeDocument/2006/math">
                     <m:r>
@@ -5332,7 +5339,7 @@
             </p:txBody>
           </p:sp>
         </mc:Choice>
-        <mc:Fallback>
+        <mc:Fallback xmlns="">
           <p:sp>
             <p:nvSpPr>
               <p:cNvPr id="2" name="Title 1"/>
@@ -5802,7 +5809,7 @@
             <a:pPr marL="349250" indent="-342900"/>
             <a:r>
               <a:rPr lang="en-US" dirty="0"/>
-              <a:t>Recurring words (actually phone clusters)</a:t>
+              <a:t>To recurring words (actually phone clusters)</a:t>
             </a:r>
           </a:p>
           <a:p>
@@ -6133,7 +6140,7 @@
           <a:p>
             <a:r>
               <a:rPr lang="en-US" dirty="0"/>
-              <a:t>Path refinement: discard part with high distortion:</a:t>
+              <a:t>Path refinement: discard the part with high distortion:</a:t>
             </a:r>
           </a:p>
           <a:p>

</xml_diff>